<commit_message>
Hot and cold obserbvable
</commit_message>
<xml_diff>
--- a/aliq.pptx
+++ b/aliq.pptx
@@ -4815,7 +4815,7 @@
             <a:pPr algn="ctr"/>
             <a:r>
               <a:rPr lang="en-US" dirty="0"/>
-              <a:t>Binding data</a:t>
+              <a:t>3. Binding data</a:t>
             </a:r>
           </a:p>
         </p:txBody>
@@ -4906,7 +4906,7 @@
             <a:pPr algn="ctr"/>
             <a:r>
               <a:rPr lang="en-US" dirty="0"/>
-              <a:t>Execute!</a:t>
+              <a:t>4. Execute!</a:t>
             </a:r>
           </a:p>
         </p:txBody>
@@ -4996,7 +4996,7 @@
             <a:pPr algn="ctr"/>
             <a:r>
               <a:rPr lang="en-US" dirty="0"/>
-              <a:t>Execute!</a:t>
+              <a:t>4. Execute!</a:t>
             </a:r>
           </a:p>
         </p:txBody>
@@ -6137,7 +6137,7 @@
             <a:pPr algn="ctr"/>
             <a:r>
               <a:rPr lang="en-US" dirty="0"/>
-              <a:t>Describing the business logic</a:t>
+              <a:t>1. Describing the business logic</a:t>
             </a:r>
           </a:p>
         </p:txBody>
@@ -6236,7 +6236,7 @@
             <a:pPr algn="ctr"/>
             <a:r>
               <a:rPr lang="en-US" dirty="0"/>
-              <a:t>Describing the business logic</a:t>
+              <a:t>1. Describing the business logic</a:t>
             </a:r>
           </a:p>
         </p:txBody>
@@ -6327,7 +6327,7 @@
             <a:pPr algn="ctr"/>
             <a:r>
               <a:rPr lang="en-US" dirty="0"/>
-              <a:t>Describing business logic</a:t>
+              <a:t>1. Describing business logic</a:t>
             </a:r>
           </a:p>
         </p:txBody>
@@ -6418,7 +6418,7 @@
             <a:pPr algn="ctr"/>
             <a:r>
               <a:rPr lang="en-US" dirty="0"/>
-              <a:t>Adapter layer</a:t>
+              <a:t>2. Adapter layer</a:t>
             </a:r>
           </a:p>
         </p:txBody>
@@ -6520,7 +6520,7 @@
             <a:pPr algn="ctr"/>
             <a:r>
               <a:rPr lang="en-US" dirty="0"/>
-              <a:t>Set up adapter layer </a:t>
+              <a:t>2. Set up adapter layer </a:t>
             </a:r>
           </a:p>
         </p:txBody>
@@ -6611,7 +6611,7 @@
             <a:pPr algn="ctr"/>
             <a:r>
               <a:rPr lang="en-US" dirty="0"/>
-              <a:t>Data Binding </a:t>
+              <a:t>3. Data Binding </a:t>
             </a:r>
           </a:p>
         </p:txBody>

</xml_diff>